<commit_message>
Updated slides and demo for Tech Valley
</commit_message>
<xml_diff>
--- a/2024-02-Tech.Valley/2024-02 SQL Server SecurityTech Valley Version.pptx
+++ b/2024-02-Tech.Valley/2024-02 SQL Server SecurityTech Valley Version.pptx
@@ -252,7 +252,7 @@
           <a:p>
             <a:fld id="{C17F2C1D-F243-42AB-ADF2-E7CB4E04900E}" type="datetimeFigureOut">
               <a:rPr lang="en-US" smtClean="0"/>
-              <a:t>2/11/2024</a:t>
+              <a:t>2/12/2024</a:t>
             </a:fld>
             <a:endParaRPr lang="en-US"/>
           </a:p>
@@ -429,7 +429,7 @@
           <a:p>
             <a:fld id="{020CE34E-5667-4A32-A6BA-10C7A552BC63}" type="datetimeFigureOut">
               <a:rPr lang="en-US" smtClean="0"/>
-              <a:t>2/11/2024</a:t>
+              <a:t>2/12/2024</a:t>
             </a:fld>
             <a:endParaRPr lang="en-US"/>
           </a:p>
@@ -22747,19 +22747,19 @@
               <a:rPr lang="en-US" sz="1800" dirty="0">
                 <a:latin typeface="Calibri" panose="020F0502020204030204" pitchFamily="34" charset="0"/>
               </a:rPr>
-              <a:t>name the column </a:t>
-            </a:r>
-            <a:r>
-              <a:rPr lang="en-US" sz="1800" dirty="0" err="1">
+              <a:t>name the column TempRowID </a:t>
+            </a:r>
+            <a:r>
+              <a:rPr lang="en-US" sz="1800">
                 <a:latin typeface="Calibri" panose="020F0502020204030204" pitchFamily="34" charset="0"/>
               </a:rPr>
-              <a:t>TempRowID</a:t>
+              <a:t>to indicate it is </a:t>
             </a:r>
             <a:r>
               <a:rPr lang="en-US" sz="1800" dirty="0">
                 <a:latin typeface="Calibri" panose="020F0502020204030204" pitchFamily="34" charset="0"/>
               </a:rPr>
-              <a:t> so it is clear that it is not a permanent value.</a:t>
+              <a:t>not a permanent value.</a:t>
             </a:r>
           </a:p>
           <a:p>
@@ -22778,19 +22778,7 @@
               <a:rPr lang="en-US" sz="1800" dirty="0">
                 <a:latin typeface="Calibri" panose="020F0502020204030204" pitchFamily="34" charset="0"/>
               </a:rPr>
-              <a:t>Avoid </a:t>
-            </a:r>
-            <a:r>
-              <a:rPr lang="en-US" sz="1800" dirty="0" err="1">
-                <a:latin typeface="Calibri" panose="020F0502020204030204" pitchFamily="34" charset="0"/>
-              </a:rPr>
-              <a:t>UniqueIdentifier</a:t>
-            </a:r>
-            <a:r>
-              <a:rPr lang="en-US" sz="1800" dirty="0">
-                <a:latin typeface="Calibri" panose="020F0502020204030204" pitchFamily="34" charset="0"/>
-              </a:rPr>
-              <a:t> (GUID) as primary key unless the table must have unique keys across multiple databases.</a:t>
+              <a:t>Avoid UniqueIdentifier (GUID) as primary key unless the table must have unique keys across multiple databases.</a:t>
             </a:r>
             <a:br>
               <a:rPr lang="en-US" sz="1800" dirty="0">
@@ -28249,21 +28237,21 @@
 </file>
 
 <file path=customXml/item2.xml><?xml version="1.0" encoding="utf-8"?>
+<?mso-contentType ?>
+<FormTemplates xmlns="http://schemas.microsoft.com/sharepoint/v3/contenttype/forms">
+  <Display>DocumentLibraryForm</Display>
+  <Edit>DocumentLibraryForm</Edit>
+  <New>DocumentLibraryForm</New>
+</FormTemplates>
+</file>
+
+<file path=customXml/item3.xml><?xml version="1.0" encoding="utf-8"?>
 <p:properties xmlns:p="http://schemas.microsoft.com/office/2006/metadata/properties" xmlns:xsi="http://www.w3.org/2001/XMLSchema-instance" xmlns:pc="http://schemas.microsoft.com/office/infopath/2007/PartnerControls">
   <documentManagement>
     <MediaServiceKeyPoints xmlns="601b033e-84b8-48ba-8dd0-f45aa126699f" xsi:nil="true"/>
     <_activity xmlns="601b033e-84b8-48ba-8dd0-f45aa126699f" xsi:nil="true"/>
   </documentManagement>
 </p:properties>
-</file>
-
-<file path=customXml/item3.xml><?xml version="1.0" encoding="utf-8"?>
-<?mso-contentType ?>
-<FormTemplates xmlns="http://schemas.microsoft.com/sharepoint/v3/contenttype/forms">
-  <Display>DocumentLibraryForm</Display>
-  <Edit>DocumentLibraryForm</Edit>
-  <New>DocumentLibraryForm</New>
-</FormTemplates>
 </file>
 
 <file path=customXml/itemProps1.xml><?xml version="1.0" encoding="utf-8"?>
@@ -28286,6 +28274,14 @@
 </file>
 
 <file path=customXml/itemProps2.xml><?xml version="1.0" encoding="utf-8"?>
+<ds:datastoreItem xmlns:ds="http://schemas.openxmlformats.org/officeDocument/2006/customXml" ds:itemID="{904751AB-E840-446F-8D49-E697067EC887}">
+  <ds:schemaRefs>
+    <ds:schemaRef ds:uri="http://schemas.microsoft.com/sharepoint/v3/contenttype/forms"/>
+  </ds:schemaRefs>
+</ds:datastoreItem>
+</file>
+
+<file path=customXml/itemProps3.xml><?xml version="1.0" encoding="utf-8"?>
 <ds:datastoreItem xmlns:ds="http://schemas.openxmlformats.org/officeDocument/2006/customXml" ds:itemID="{50811A92-D464-4AC4-A396-BA73B10CEEAC}">
   <ds:schemaRefs>
     <ds:schemaRef ds:uri="http://purl.org/dc/elements/1.1/"/>
@@ -28302,14 +28298,6 @@
 </ds:datastoreItem>
 </file>
 
-<file path=customXml/itemProps3.xml><?xml version="1.0" encoding="utf-8"?>
-<ds:datastoreItem xmlns:ds="http://schemas.openxmlformats.org/officeDocument/2006/customXml" ds:itemID="{904751AB-E840-446F-8D49-E697067EC887}">
-  <ds:schemaRefs>
-    <ds:schemaRef ds:uri="http://schemas.microsoft.com/sharepoint/v3/contenttype/forms"/>
-  </ds:schemaRefs>
-</ds:datastoreItem>
-</file>
-
 <file path=docMetadata/LabelInfo.xml><?xml version="1.0" encoding="utf-8"?>
 <clbl:labelList xmlns:clbl="http://schemas.microsoft.com/office/2020/mipLabelMetadata">
   <clbl:label id="{f42aa342-8706-4288-bd11-ebb85995028c}" enabled="1" method="Standard" siteId="{72f988bf-86f1-41af-91ab-2d7cd011db47}" contentBits="0" removed="0"/>

</xml_diff>

<commit_message>
Final changes for this repo
</commit_message>
<xml_diff>
--- a/2024-02-Tech.Valley/2024-02 SQL Server SecurityTech Valley Version.pptx
+++ b/2024-02-Tech.Valley/2024-02 SQL Server SecurityTech Valley Version.pptx
@@ -5,10 +5,10 @@
     <p:sldMasterId id="2147483684" r:id="rId4"/>
   </p:sldMasterIdLst>
   <p:notesMasterIdLst>
-    <p:notesMasterId r:id="rId24"/>
+    <p:notesMasterId r:id="rId23"/>
   </p:notesMasterIdLst>
   <p:handoutMasterIdLst>
-    <p:handoutMasterId r:id="rId25"/>
+    <p:handoutMasterId r:id="rId24"/>
   </p:handoutMasterIdLst>
   <p:sldIdLst>
     <p:sldId id="257" r:id="rId5"/>
@@ -27,9 +27,8 @@
     <p:sldId id="404" r:id="rId18"/>
     <p:sldId id="399" r:id="rId19"/>
     <p:sldId id="401" r:id="rId20"/>
-    <p:sldId id="400" r:id="rId21"/>
-    <p:sldId id="403" r:id="rId22"/>
-    <p:sldId id="395" r:id="rId23"/>
+    <p:sldId id="403" r:id="rId21"/>
+    <p:sldId id="395" r:id="rId22"/>
   </p:sldIdLst>
   <p:sldSz cx="12192000" cy="6858000"/>
   <p:notesSz cx="6858000" cy="9144000"/>
@@ -1458,90 +1457,6 @@
             <a:fld id="{1983A999-5E0E-42CA-8400-604AE921FF7C}" type="slidenum">
               <a:rPr lang="en-US" smtClean="0"/>
               <a:t>17</a:t>
-            </a:fld>
-            <a:endParaRPr lang="en-US"/>
-          </a:p>
-        </p:txBody>
-      </p:sp>
-    </p:spTree>
-    <p:extLst>
-      <p:ext uri="{BB962C8B-B14F-4D97-AF65-F5344CB8AC3E}">
-        <p14:creationId xmlns:p14="http://schemas.microsoft.com/office/powerpoint/2010/main" val="839986257"/>
-      </p:ext>
-    </p:extLst>
-  </p:cSld>
-  <p:clrMapOvr>
-    <a:masterClrMapping/>
-  </p:clrMapOvr>
-</p:notes>
-</file>
-
-<file path=ppt/notesSlides/notesSlide18.xml><?xml version="1.0" encoding="utf-8"?>
-<p:notes xmlns:a="http://schemas.openxmlformats.org/drawingml/2006/main" xmlns:r="http://schemas.openxmlformats.org/officeDocument/2006/relationships" xmlns:p="http://schemas.openxmlformats.org/presentationml/2006/main">
-  <p:cSld>
-    <p:spTree>
-      <p:nvGrpSpPr>
-        <p:cNvPr id="1" name=""/>
-        <p:cNvGrpSpPr/>
-        <p:nvPr/>
-      </p:nvGrpSpPr>
-      <p:grpSpPr>
-        <a:xfrm>
-          <a:off x="0" y="0"/>
-          <a:ext cx="0" cy="0"/>
-          <a:chOff x="0" y="0"/>
-          <a:chExt cx="0" cy="0"/>
-        </a:xfrm>
-      </p:grpSpPr>
-      <p:sp>
-        <p:nvSpPr>
-          <p:cNvPr id="2" name="Slide Image Placeholder 1"/>
-          <p:cNvSpPr>
-            <a:spLocks noGrp="1" noRot="1" noChangeAspect="1"/>
-          </p:cNvSpPr>
-          <p:nvPr>
-            <p:ph type="sldImg"/>
-          </p:nvPr>
-        </p:nvSpPr>
-        <p:spPr/>
-      </p:sp>
-      <p:sp>
-        <p:nvSpPr>
-          <p:cNvPr id="3" name="Notes Placeholder 2"/>
-          <p:cNvSpPr>
-            <a:spLocks noGrp="1"/>
-          </p:cNvSpPr>
-          <p:nvPr>
-            <p:ph type="body" idx="1"/>
-          </p:nvPr>
-        </p:nvSpPr>
-        <p:spPr/>
-        <p:txBody>
-          <a:bodyPr/>
-          <a:lstStyle/>
-          <a:p>
-            <a:endParaRPr lang="en-US" dirty="0"/>
-          </a:p>
-        </p:txBody>
-      </p:sp>
-      <p:sp>
-        <p:nvSpPr>
-          <p:cNvPr id="4" name="Slide Number Placeholder 3"/>
-          <p:cNvSpPr>
-            <a:spLocks noGrp="1"/>
-          </p:cNvSpPr>
-          <p:nvPr>
-            <p:ph type="sldNum" sz="quarter" idx="5"/>
-          </p:nvPr>
-        </p:nvSpPr>
-        <p:spPr/>
-        <p:txBody>
-          <a:bodyPr/>
-          <a:lstStyle/>
-          <a:p>
-            <a:fld id="{1983A999-5E0E-42CA-8400-604AE921FF7C}" type="slidenum">
-              <a:rPr lang="en-US" smtClean="0"/>
-              <a:t>18</a:t>
             </a:fld>
             <a:endParaRPr lang="en-US"/>
           </a:p>
@@ -20532,7 +20447,7 @@
         </p:nvSpPr>
         <p:spPr>
           <a:xfrm>
-            <a:off x="389977" y="473395"/>
+            <a:off x="550863" y="4508500"/>
             <a:ext cx="4500562" cy="1562959"/>
           </a:xfrm>
         </p:spPr>
@@ -20547,6 +20462,40 @@
           </a:p>
         </p:txBody>
       </p:sp>
+      <p:pic>
+        <p:nvPicPr>
+          <p:cNvPr id="16" name="Picture Placeholder 15" descr="Data Points Digital background">
+            <a:extLst>
+              <a:ext uri="{FF2B5EF4-FFF2-40B4-BE49-F238E27FC236}">
+                <a16:creationId xmlns:a16="http://schemas.microsoft.com/office/drawing/2014/main" id="{361E9ADB-7377-4CF1-9AE4-AEFBDEBEEEEC}"/>
+              </a:ext>
+            </a:extLst>
+          </p:cNvPr>
+          <p:cNvPicPr>
+            <a:picLocks noGrp="1" noChangeAspect="1"/>
+          </p:cNvPicPr>
+          <p:nvPr>
+            <p:ph type="pic" sz="quarter" idx="13"/>
+          </p:nvPr>
+        </p:nvPicPr>
+        <p:blipFill rotWithShape="1">
+          <a:blip r:embed="rId3" cstate="screen">
+            <a:extLst>
+              <a:ext uri="{28A0092B-C50C-407E-A947-70E740481C1C}">
+                <a14:useLocalDpi xmlns:a14="http://schemas.microsoft.com/office/drawing/2010/main" val="0"/>
+              </a:ext>
+            </a:extLst>
+          </a:blip>
+          <a:srcRect/>
+          <a:stretch/>
+        </p:blipFill>
+        <p:spPr>
+          <a:xfrm>
+            <a:off x="0" y="0"/>
+            <a:ext cx="12192000" cy="3776472"/>
+          </a:xfrm>
+        </p:spPr>
+      </p:pic>
       <p:sp>
         <p:nvSpPr>
           <p:cNvPr id="13" name="Content Placeholder 12">
@@ -20565,8 +20514,8 @@
         </p:nvSpPr>
         <p:spPr>
           <a:xfrm>
-            <a:off x="389976" y="2332138"/>
-            <a:ext cx="11597891" cy="3842159"/>
+            <a:off x="3520036" y="4508500"/>
+            <a:ext cx="8129194" cy="1563688"/>
           </a:xfrm>
         </p:spPr>
         <p:txBody>
@@ -20576,31 +20525,15 @@
           <a:lstStyle/>
           <a:p>
             <a:r>
-              <a:rPr lang="en-US" sz="2800" dirty="0"/>
-              <a:t>SQL Server Developer Edition - Free Enterprise Level Single User Version</a:t>
-            </a:r>
-          </a:p>
-          <a:p>
-            <a:r>
-              <a:rPr lang="en-US" sz="2800" dirty="0"/>
-              <a:t>    https://www.microsoft.com/en-us/sql-server/sql-server-downloads</a:t>
-            </a:r>
-          </a:p>
-          <a:p>
-            <a:endParaRPr lang="en-US" sz="2800" dirty="0"/>
-          </a:p>
-          <a:p>
-            <a:r>
-              <a:rPr lang="en-US" sz="2800" dirty="0"/>
-              <a:t>AdventureWorks2012 Sample Database - used in demos</a:t>
-            </a:r>
-          </a:p>
-          <a:p>
-            <a:r>
-              <a:rPr lang="en-US" sz="2800" dirty="0"/>
-              <a:t> https://learn.microsoft.com/en-us/sql/samples/adventureworks-install-configure?view=sql-server-ver16&amp;tabs=ssms</a:t>
-            </a:r>
-            <a:endParaRPr lang="en-US" sz="1800" dirty="0"/>
+              <a:rPr lang="en-US" sz="3200" dirty="0"/>
+              <a:t>https://github.com/joekunk/sql-server-security</a:t>
+            </a:r>
+          </a:p>
+          <a:p>
+            <a:r>
+              <a:rPr lang="en-US" dirty="0"/>
+              <a:t>Public repo with the materials and scripts from this presentation</a:t>
+            </a:r>
           </a:p>
         </p:txBody>
       </p:sp>
@@ -20709,7 +20642,7 @@
     </p:spTree>
     <p:extLst>
       <p:ext uri="{BB962C8B-B14F-4D97-AF65-F5344CB8AC3E}">
-        <p14:creationId xmlns:p14="http://schemas.microsoft.com/office/powerpoint/2010/main" val="3441738824"/>
+        <p14:creationId xmlns:p14="http://schemas.microsoft.com/office/powerpoint/2010/main" val="1612923039"/>
       </p:ext>
     </p:extLst>
   </p:cSld>
@@ -20738,246 +20671,6 @@
       </p:grpSpPr>
       <p:sp>
         <p:nvSpPr>
-          <p:cNvPr id="11" name="Title 10">
-            <a:extLst>
-              <a:ext uri="{FF2B5EF4-FFF2-40B4-BE49-F238E27FC236}">
-                <a16:creationId xmlns:a16="http://schemas.microsoft.com/office/drawing/2014/main" id="{581E8936-2270-47FE-94A4-398CB123EF90}"/>
-              </a:ext>
-            </a:extLst>
-          </p:cNvPr>
-          <p:cNvSpPr>
-            <a:spLocks noGrp="1"/>
-          </p:cNvSpPr>
-          <p:nvPr>
-            <p:ph type="title"/>
-          </p:nvPr>
-        </p:nvSpPr>
-        <p:spPr>
-          <a:xfrm>
-            <a:off x="550863" y="4508500"/>
-            <a:ext cx="4500562" cy="1562959"/>
-          </a:xfrm>
-        </p:spPr>
-        <p:txBody>
-          <a:bodyPr/>
-          <a:lstStyle/>
-          <a:p>
-            <a:r>
-              <a:rPr lang="en-US" dirty="0"/>
-              <a:t>Resources</a:t>
-            </a:r>
-          </a:p>
-        </p:txBody>
-      </p:sp>
-      <p:pic>
-        <p:nvPicPr>
-          <p:cNvPr id="16" name="Picture Placeholder 15" descr="Data Points Digital background">
-            <a:extLst>
-              <a:ext uri="{FF2B5EF4-FFF2-40B4-BE49-F238E27FC236}">
-                <a16:creationId xmlns:a16="http://schemas.microsoft.com/office/drawing/2014/main" id="{361E9ADB-7377-4CF1-9AE4-AEFBDEBEEEEC}"/>
-              </a:ext>
-            </a:extLst>
-          </p:cNvPr>
-          <p:cNvPicPr>
-            <a:picLocks noGrp="1" noChangeAspect="1"/>
-          </p:cNvPicPr>
-          <p:nvPr>
-            <p:ph type="pic" sz="quarter" idx="13"/>
-          </p:nvPr>
-        </p:nvPicPr>
-        <p:blipFill rotWithShape="1">
-          <a:blip r:embed="rId3" cstate="screen">
-            <a:extLst>
-              <a:ext uri="{28A0092B-C50C-407E-A947-70E740481C1C}">
-                <a14:useLocalDpi xmlns:a14="http://schemas.microsoft.com/office/drawing/2010/main" val="0"/>
-              </a:ext>
-            </a:extLst>
-          </a:blip>
-          <a:srcRect/>
-          <a:stretch/>
-        </p:blipFill>
-        <p:spPr>
-          <a:xfrm>
-            <a:off x="0" y="0"/>
-            <a:ext cx="12192000" cy="3776472"/>
-          </a:xfrm>
-        </p:spPr>
-      </p:pic>
-      <p:sp>
-        <p:nvSpPr>
-          <p:cNvPr id="13" name="Content Placeholder 12">
-            <a:extLst>
-              <a:ext uri="{FF2B5EF4-FFF2-40B4-BE49-F238E27FC236}">
-                <a16:creationId xmlns:a16="http://schemas.microsoft.com/office/drawing/2014/main" id="{C0287FEC-3826-4868-8D93-52429C6156F5}"/>
-              </a:ext>
-            </a:extLst>
-          </p:cNvPr>
-          <p:cNvSpPr>
-            <a:spLocks noGrp="1"/>
-          </p:cNvSpPr>
-          <p:nvPr>
-            <p:ph sz="quarter" idx="15"/>
-          </p:nvPr>
-        </p:nvSpPr>
-        <p:spPr>
-          <a:xfrm>
-            <a:off x="3520036" y="4508500"/>
-            <a:ext cx="8129194" cy="1563688"/>
-          </a:xfrm>
-        </p:spPr>
-        <p:txBody>
-          <a:bodyPr>
-            <a:normAutofit/>
-          </a:bodyPr>
-          <a:lstStyle/>
-          <a:p>
-            <a:r>
-              <a:rPr lang="en-US" sz="3200" dirty="0"/>
-              <a:t>https://github.com/joekunk/sql-server-security</a:t>
-            </a:r>
-          </a:p>
-          <a:p>
-            <a:r>
-              <a:rPr lang="en-US" dirty="0"/>
-              <a:t>Public repo with the materials and scripts from this presentation</a:t>
-            </a:r>
-          </a:p>
-        </p:txBody>
-      </p:sp>
-      <p:sp>
-        <p:nvSpPr>
-          <p:cNvPr id="4" name="Date Placeholder 3">
-            <a:extLst>
-              <a:ext uri="{FF2B5EF4-FFF2-40B4-BE49-F238E27FC236}">
-                <a16:creationId xmlns:a16="http://schemas.microsoft.com/office/drawing/2014/main" id="{0C329F70-04F7-4C70-BCF8-D4371F54EF2F}"/>
-              </a:ext>
-            </a:extLst>
-          </p:cNvPr>
-          <p:cNvSpPr>
-            <a:spLocks noGrp="1"/>
-          </p:cNvSpPr>
-          <p:nvPr>
-            <p:ph type="dt" sz="half" idx="10"/>
-          </p:nvPr>
-        </p:nvSpPr>
-        <p:spPr>
-          <a:xfrm>
-            <a:off x="550863" y="6507212"/>
-            <a:ext cx="2628900" cy="153888"/>
-          </a:xfrm>
-        </p:spPr>
-        <p:txBody>
-          <a:bodyPr/>
-          <a:lstStyle/>
-          <a:p>
-            <a:r>
-              <a:rPr lang="en-US" sz="1400" dirty="0"/>
-              <a:t>Tuesday February 13, 2024</a:t>
-            </a:r>
-          </a:p>
-        </p:txBody>
-      </p:sp>
-      <p:sp>
-        <p:nvSpPr>
-          <p:cNvPr id="5" name="Footer Placeholder 4">
-            <a:extLst>
-              <a:ext uri="{FF2B5EF4-FFF2-40B4-BE49-F238E27FC236}">
-                <a16:creationId xmlns:a16="http://schemas.microsoft.com/office/drawing/2014/main" id="{06A3302E-502D-4151-81C9-5FD6AF9596D6}"/>
-              </a:ext>
-            </a:extLst>
-          </p:cNvPr>
-          <p:cNvSpPr>
-            <a:spLocks noGrp="1"/>
-          </p:cNvSpPr>
-          <p:nvPr>
-            <p:ph type="ftr" sz="quarter" idx="11"/>
-          </p:nvPr>
-        </p:nvSpPr>
-        <p:spPr>
-          <a:xfrm>
-            <a:off x="3359150" y="6507212"/>
-            <a:ext cx="6379210" cy="153888"/>
-          </a:xfrm>
-        </p:spPr>
-        <p:txBody>
-          <a:bodyPr/>
-          <a:lstStyle/>
-          <a:p>
-            <a:r>
-              <a:rPr lang="nl-NL" sz="1400" dirty="0"/>
-              <a:t>Tech Valley .NET User Group</a:t>
-            </a:r>
-            <a:endParaRPr lang="en-US" sz="1400" dirty="0"/>
-          </a:p>
-        </p:txBody>
-      </p:sp>
-      <p:sp>
-        <p:nvSpPr>
-          <p:cNvPr id="6" name="Slide Number Placeholder 5">
-            <a:extLst>
-              <a:ext uri="{FF2B5EF4-FFF2-40B4-BE49-F238E27FC236}">
-                <a16:creationId xmlns:a16="http://schemas.microsoft.com/office/drawing/2014/main" id="{9ED907F8-C614-4D59-A03F-BF9CD5E35703}"/>
-              </a:ext>
-            </a:extLst>
-          </p:cNvPr>
-          <p:cNvSpPr>
-            <a:spLocks noGrp="1"/>
-          </p:cNvSpPr>
-          <p:nvPr>
-            <p:ph type="sldNum" sz="quarter" idx="12"/>
-          </p:nvPr>
-        </p:nvSpPr>
-        <p:spPr>
-          <a:xfrm>
-            <a:off x="9948863" y="6507212"/>
-            <a:ext cx="1692274" cy="153888"/>
-          </a:xfrm>
-        </p:spPr>
-        <p:txBody>
-          <a:bodyPr/>
-          <a:lstStyle/>
-          <a:p>
-            <a:fld id="{DBA1B0FB-D917-4C8C-928F-313BD683BF39}" type="slidenum">
-              <a:rPr lang="en-US" sz="1400" smtClean="0"/>
-              <a:pPr/>
-              <a:t>18</a:t>
-            </a:fld>
-            <a:endParaRPr lang="en-US" sz="1400"/>
-          </a:p>
-        </p:txBody>
-      </p:sp>
-    </p:spTree>
-    <p:extLst>
-      <p:ext uri="{BB962C8B-B14F-4D97-AF65-F5344CB8AC3E}">
-        <p14:creationId xmlns:p14="http://schemas.microsoft.com/office/powerpoint/2010/main" val="1612923039"/>
-      </p:ext>
-    </p:extLst>
-  </p:cSld>
-  <p:clrMapOvr>
-    <a:masterClrMapping/>
-  </p:clrMapOvr>
-</p:sld>
-</file>
-
-<file path=ppt/slides/slide19.xml><?xml version="1.0" encoding="utf-8"?>
-<p:sld xmlns:a="http://schemas.openxmlformats.org/drawingml/2006/main" xmlns:r="http://schemas.openxmlformats.org/officeDocument/2006/relationships" xmlns:p="http://schemas.openxmlformats.org/presentationml/2006/main">
-  <p:cSld>
-    <p:spTree>
-      <p:nvGrpSpPr>
-        <p:cNvPr id="1" name=""/>
-        <p:cNvGrpSpPr/>
-        <p:nvPr/>
-      </p:nvGrpSpPr>
-      <p:grpSpPr>
-        <a:xfrm>
-          <a:off x="0" y="0"/>
-          <a:ext cx="0" cy="0"/>
-          <a:chOff x="0" y="0"/>
-          <a:chExt cx="0" cy="0"/>
-        </a:xfrm>
-      </p:grpSpPr>
-      <p:sp>
-        <p:nvSpPr>
           <p:cNvPr id="22" name="Title 21">
             <a:extLst>
               <a:ext uri="{FF2B5EF4-FFF2-40B4-BE49-F238E27FC236}">
@@ -21235,7 +20928,7 @@
             <a:fld id="{DBA1B0FB-D917-4C8C-928F-313BD683BF39}" type="slidenum">
               <a:rPr lang="en-US" sz="1400" smtClean="0"/>
               <a:pPr/>
-              <a:t>19</a:t>
+              <a:t>18</a:t>
             </a:fld>
             <a:endParaRPr lang="en-US" sz="1400"/>
           </a:p>
@@ -22747,19 +22440,7 @@
               <a:rPr lang="en-US" sz="1800" dirty="0">
                 <a:latin typeface="Calibri" panose="020F0502020204030204" pitchFamily="34" charset="0"/>
               </a:rPr>
-              <a:t>name the column TempRowID </a:t>
-            </a:r>
-            <a:r>
-              <a:rPr lang="en-US" sz="1800">
-                <a:latin typeface="Calibri" panose="020F0502020204030204" pitchFamily="34" charset="0"/>
-              </a:rPr>
-              <a:t>to indicate it is </a:t>
-            </a:r>
-            <a:r>
-              <a:rPr lang="en-US" sz="1800" dirty="0">
-                <a:latin typeface="Calibri" panose="020F0502020204030204" pitchFamily="34" charset="0"/>
-              </a:rPr>
-              <a:t>not a permanent value.</a:t>
+              <a:t>name the column TempRowID to indicate it is not a permanent value.</a:t>
             </a:r>
           </a:p>
           <a:p>

</xml_diff>